<commit_message>
Update without Shizuoka #8
</commit_message>
<xml_diff>
--- a/jaws-ug-map.pptx
+++ b/jaws-ug-map.pptx
@@ -263,7 +263,7 @@
           <a:p>
             <a:fld id="{5BB77CFB-1EF2-0545-960B-65D7746E405D}" type="datetimeFigureOut">
               <a:rPr kumimoji="1" lang="ja-JP" altLang="en-US" smtClean="0"/>
-              <a:t>2022/8/31</a:t>
+              <a:t>2023/7/22</a:t>
             </a:fld>
             <a:endParaRPr kumimoji="1" lang="ja-JP" altLang="en-US"/>
           </a:p>
@@ -493,7 +493,7 @@
           <a:p>
             <a:fld id="{5BB77CFB-1EF2-0545-960B-65D7746E405D}" type="datetimeFigureOut">
               <a:rPr kumimoji="1" lang="ja-JP" altLang="en-US" smtClean="0"/>
-              <a:t>2022/8/31</a:t>
+              <a:t>2023/7/22</a:t>
             </a:fld>
             <a:endParaRPr kumimoji="1" lang="ja-JP" altLang="en-US"/>
           </a:p>
@@ -733,7 +733,7 @@
           <a:p>
             <a:fld id="{5BB77CFB-1EF2-0545-960B-65D7746E405D}" type="datetimeFigureOut">
               <a:rPr kumimoji="1" lang="ja-JP" altLang="en-US" smtClean="0"/>
-              <a:t>2022/8/31</a:t>
+              <a:t>2023/7/22</a:t>
             </a:fld>
             <a:endParaRPr kumimoji="1" lang="ja-JP" altLang="en-US"/>
           </a:p>
@@ -953,7 +953,7 @@
           <a:p>
             <a:fld id="{5BB77CFB-1EF2-0545-960B-65D7746E405D}" type="datetimeFigureOut">
               <a:rPr kumimoji="1" lang="ja-JP" altLang="en-US" smtClean="0"/>
-              <a:t>2022/8/31</a:t>
+              <a:t>2023/7/22</a:t>
             </a:fld>
             <a:endParaRPr kumimoji="1" lang="ja-JP" altLang="en-US"/>
           </a:p>
@@ -1183,7 +1183,7 @@
           <a:p>
             <a:fld id="{5BB77CFB-1EF2-0545-960B-65D7746E405D}" type="datetimeFigureOut">
               <a:rPr kumimoji="1" lang="ja-JP" altLang="en-US" smtClean="0"/>
-              <a:t>2022/8/31</a:t>
+              <a:t>2023/7/22</a:t>
             </a:fld>
             <a:endParaRPr kumimoji="1" lang="ja-JP" altLang="en-US"/>
           </a:p>
@@ -1458,7 +1458,7 @@
           <a:p>
             <a:fld id="{5BB77CFB-1EF2-0545-960B-65D7746E405D}" type="datetimeFigureOut">
               <a:rPr kumimoji="1" lang="ja-JP" altLang="en-US" smtClean="0"/>
-              <a:t>2022/8/31</a:t>
+              <a:t>2023/7/22</a:t>
             </a:fld>
             <a:endParaRPr kumimoji="1" lang="ja-JP" altLang="en-US"/>
           </a:p>
@@ -1787,7 +1787,7 @@
           <a:p>
             <a:fld id="{5BB77CFB-1EF2-0545-960B-65D7746E405D}" type="datetimeFigureOut">
               <a:rPr kumimoji="1" lang="ja-JP" altLang="en-US" smtClean="0"/>
-              <a:t>2022/8/31</a:t>
+              <a:t>2023/7/22</a:t>
             </a:fld>
             <a:endParaRPr kumimoji="1" lang="ja-JP" altLang="en-US"/>
           </a:p>
@@ -2263,7 +2263,7 @@
           <a:p>
             <a:fld id="{5BB77CFB-1EF2-0545-960B-65D7746E405D}" type="datetimeFigureOut">
               <a:rPr kumimoji="1" lang="ja-JP" altLang="en-US" smtClean="0"/>
-              <a:t>2022/8/31</a:t>
+              <a:t>2023/7/22</a:t>
             </a:fld>
             <a:endParaRPr kumimoji="1" lang="ja-JP" altLang="en-US"/>
           </a:p>
@@ -2404,7 +2404,7 @@
           <a:p>
             <a:fld id="{5BB77CFB-1EF2-0545-960B-65D7746E405D}" type="datetimeFigureOut">
               <a:rPr kumimoji="1" lang="ja-JP" altLang="en-US" smtClean="0"/>
-              <a:t>2022/8/31</a:t>
+              <a:t>2023/7/22</a:t>
             </a:fld>
             <a:endParaRPr kumimoji="1" lang="ja-JP" altLang="en-US"/>
           </a:p>
@@ -2517,7 +2517,7 @@
           <a:p>
             <a:fld id="{5BB77CFB-1EF2-0545-960B-65D7746E405D}" type="datetimeFigureOut">
               <a:rPr kumimoji="1" lang="ja-JP" altLang="en-US" smtClean="0"/>
-              <a:t>2022/8/31</a:t>
+              <a:t>2023/7/22</a:t>
             </a:fld>
             <a:endParaRPr kumimoji="1" lang="ja-JP" altLang="en-US"/>
           </a:p>
@@ -2860,7 +2860,7 @@
           <a:p>
             <a:fld id="{5BB77CFB-1EF2-0545-960B-65D7746E405D}" type="datetimeFigureOut">
               <a:rPr kumimoji="1" lang="ja-JP" altLang="en-US" smtClean="0"/>
-              <a:t>2022/8/31</a:t>
+              <a:t>2023/7/22</a:t>
             </a:fld>
             <a:endParaRPr kumimoji="1" lang="ja-JP" altLang="en-US"/>
           </a:p>
@@ -3090,7 +3090,7 @@
           <a:p>
             <a:fld id="{5BB77CFB-1EF2-0545-960B-65D7746E405D}" type="datetimeFigureOut">
               <a:rPr kumimoji="1" lang="ja-JP" altLang="en-US" smtClean="0"/>
-              <a:t>2022/8/31</a:t>
+              <a:t>2023/7/22</a:t>
             </a:fld>
             <a:endParaRPr kumimoji="1" lang="ja-JP" altLang="en-US"/>
           </a:p>
@@ -3378,7 +3378,7 @@
           <a:p>
             <a:fld id="{5BB77CFB-1EF2-0545-960B-65D7746E405D}" type="datetimeFigureOut">
               <a:rPr kumimoji="1" lang="ja-JP" altLang="en-US" smtClean="0"/>
-              <a:t>2022/8/31</a:t>
+              <a:t>2023/7/22</a:t>
             </a:fld>
             <a:endParaRPr kumimoji="1" lang="ja-JP" altLang="en-US"/>
           </a:p>
@@ -3608,7 +3608,7 @@
           <a:p>
             <a:fld id="{5BB77CFB-1EF2-0545-960B-65D7746E405D}" type="datetimeFigureOut">
               <a:rPr kumimoji="1" lang="ja-JP" altLang="en-US" smtClean="0"/>
-              <a:t>2022/8/31</a:t>
+              <a:t>2023/7/22</a:t>
             </a:fld>
             <a:endParaRPr kumimoji="1" lang="ja-JP" altLang="en-US"/>
           </a:p>
@@ -3848,7 +3848,7 @@
           <a:p>
             <a:fld id="{5BB77CFB-1EF2-0545-960B-65D7746E405D}" type="datetimeFigureOut">
               <a:rPr kumimoji="1" lang="ja-JP" altLang="en-US" smtClean="0"/>
-              <a:t>2022/8/31</a:t>
+              <a:t>2023/7/22</a:t>
             </a:fld>
             <a:endParaRPr kumimoji="1" lang="ja-JP" altLang="en-US"/>
           </a:p>
@@ -4123,7 +4123,7 @@
           <a:p>
             <a:fld id="{5BB77CFB-1EF2-0545-960B-65D7746E405D}" type="datetimeFigureOut">
               <a:rPr kumimoji="1" lang="ja-JP" altLang="en-US" smtClean="0"/>
-              <a:t>2022/8/31</a:t>
+              <a:t>2023/7/22</a:t>
             </a:fld>
             <a:endParaRPr kumimoji="1" lang="ja-JP" altLang="en-US"/>
           </a:p>
@@ -4452,7 +4452,7 @@
           <a:p>
             <a:fld id="{5BB77CFB-1EF2-0545-960B-65D7746E405D}" type="datetimeFigureOut">
               <a:rPr kumimoji="1" lang="ja-JP" altLang="en-US" smtClean="0"/>
-              <a:t>2022/8/31</a:t>
+              <a:t>2023/7/22</a:t>
             </a:fld>
             <a:endParaRPr kumimoji="1" lang="ja-JP" altLang="en-US"/>
           </a:p>
@@ -4928,7 +4928,7 @@
           <a:p>
             <a:fld id="{5BB77CFB-1EF2-0545-960B-65D7746E405D}" type="datetimeFigureOut">
               <a:rPr kumimoji="1" lang="ja-JP" altLang="en-US" smtClean="0"/>
-              <a:t>2022/8/31</a:t>
+              <a:t>2023/7/22</a:t>
             </a:fld>
             <a:endParaRPr kumimoji="1" lang="ja-JP" altLang="en-US"/>
           </a:p>
@@ -5069,7 +5069,7 @@
           <a:p>
             <a:fld id="{5BB77CFB-1EF2-0545-960B-65D7746E405D}" type="datetimeFigureOut">
               <a:rPr kumimoji="1" lang="ja-JP" altLang="en-US" smtClean="0"/>
-              <a:t>2022/8/31</a:t>
+              <a:t>2023/7/22</a:t>
             </a:fld>
             <a:endParaRPr kumimoji="1" lang="ja-JP" altLang="en-US"/>
           </a:p>
@@ -5182,7 +5182,7 @@
           <a:p>
             <a:fld id="{5BB77CFB-1EF2-0545-960B-65D7746E405D}" type="datetimeFigureOut">
               <a:rPr kumimoji="1" lang="ja-JP" altLang="en-US" smtClean="0"/>
-              <a:t>2022/8/31</a:t>
+              <a:t>2023/7/22</a:t>
             </a:fld>
             <a:endParaRPr kumimoji="1" lang="ja-JP" altLang="en-US"/>
           </a:p>
@@ -5525,7 +5525,7 @@
           <a:p>
             <a:fld id="{5BB77CFB-1EF2-0545-960B-65D7746E405D}" type="datetimeFigureOut">
               <a:rPr kumimoji="1" lang="ja-JP" altLang="en-US" smtClean="0"/>
-              <a:t>2022/8/31</a:t>
+              <a:t>2023/7/22</a:t>
             </a:fld>
             <a:endParaRPr kumimoji="1" lang="ja-JP" altLang="en-US"/>
           </a:p>
@@ -5813,7 +5813,7 @@
           <a:p>
             <a:fld id="{5BB77CFB-1EF2-0545-960B-65D7746E405D}" type="datetimeFigureOut">
               <a:rPr kumimoji="1" lang="ja-JP" altLang="en-US" smtClean="0"/>
-              <a:t>2022/8/31</a:t>
+              <a:t>2023/7/22</a:t>
             </a:fld>
             <a:endParaRPr kumimoji="1" lang="ja-JP" altLang="en-US"/>
           </a:p>
@@ -6086,7 +6086,7 @@
           <a:p>
             <a:fld id="{5BB77CFB-1EF2-0545-960B-65D7746E405D}" type="datetimeFigureOut">
               <a:rPr kumimoji="1" lang="ja-JP" altLang="en-US" smtClean="0"/>
-              <a:t>2022/8/31</a:t>
+              <a:t>2023/7/22</a:t>
             </a:fld>
             <a:endParaRPr kumimoji="1" lang="ja-JP" altLang="en-US"/>
           </a:p>
@@ -6686,7 +6686,7 @@
           <a:p>
             <a:fld id="{5BB77CFB-1EF2-0545-960B-65D7746E405D}" type="datetimeFigureOut">
               <a:rPr kumimoji="1" lang="ja-JP" altLang="en-US" smtClean="0"/>
-              <a:t>2022/8/31</a:t>
+              <a:t>2023/7/22</a:t>
             </a:fld>
             <a:endParaRPr kumimoji="1" lang="ja-JP" altLang="en-US"/>
           </a:p>
@@ -8447,60 +8447,6 @@
           </p:sp>
           <p:sp>
             <p:nvSpPr>
-              <p:cNvPr id="35" name="テキスト ボックス 34">
-                <a:extLst>
-                  <a:ext uri="{FF2B5EF4-FFF2-40B4-BE49-F238E27FC236}">
-                    <a16:creationId xmlns:a16="http://schemas.microsoft.com/office/drawing/2014/main" id="{F7DBD9A4-386D-405B-6EBE-D7329DF05B5D}"/>
-                  </a:ext>
-                </a:extLst>
-              </p:cNvPr>
-              <p:cNvSpPr txBox="1"/>
-              <p:nvPr/>
-            </p:nvSpPr>
-            <p:spPr>
-              <a:xfrm>
-                <a:off x="3489674" y="5671372"/>
-                <a:ext cx="684803" cy="292388"/>
-              </a:xfrm>
-              <a:prstGeom prst="rect">
-                <a:avLst/>
-              </a:prstGeom>
-              <a:noFill/>
-            </p:spPr>
-            <p:txBody>
-              <a:bodyPr wrap="none" rtlCol="0">
-                <a:spAutoFit/>
-              </a:bodyPr>
-              <a:lstStyle/>
-              <a:p>
-                <a:r>
-                  <a:rPr lang="ja-JP" altLang="en-US" sz="1300">
-                    <a:solidFill>
-                      <a:schemeClr val="bg2">
-                        <a:lumMod val="10000"/>
-                      </a:schemeClr>
-                    </a:solidFill>
-                    <a:latin typeface="Meiryo UI" panose="020B0604030504040204" pitchFamily="34" charset="-128"/>
-                    <a:ea typeface="Meiryo UI" panose="020B0604030504040204" pitchFamily="34" charset="-128"/>
-                    <a:cs typeface="Arial" panose="020B0604020202020204" pitchFamily="34" charset="0"/>
-                  </a:rPr>
-                  <a:t>鹿児島</a:t>
-                </a:r>
-                <a:endParaRPr kumimoji="1" lang="ja-JP" altLang="en-US" sz="1300">
-                  <a:solidFill>
-                    <a:schemeClr val="bg2">
-                      <a:lumMod val="10000"/>
-                    </a:schemeClr>
-                  </a:solidFill>
-                  <a:latin typeface="Meiryo UI" panose="020B0604030504040204" pitchFamily="34" charset="-128"/>
-                  <a:ea typeface="Meiryo UI" panose="020B0604030504040204" pitchFamily="34" charset="-128"/>
-                  <a:cs typeface="Arial" panose="020B0604020202020204" pitchFamily="34" charset="0"/>
-                </a:endParaRPr>
-              </a:p>
-            </p:txBody>
-          </p:sp>
-          <p:sp>
-            <p:nvSpPr>
               <p:cNvPr id="36" name="テキスト ボックス 35">
                 <a:extLst>
                   <a:ext uri="{FF2B5EF4-FFF2-40B4-BE49-F238E27FC236}">
@@ -11730,106 +11676,6 @@
           </p:sp>
           <p:cxnSp>
             <p:nvCxnSpPr>
-              <p:cNvPr id="137" name="直線コネクタ 136">
-                <a:extLst>
-                  <a:ext uri="{FF2B5EF4-FFF2-40B4-BE49-F238E27FC236}">
-                    <a16:creationId xmlns:a16="http://schemas.microsoft.com/office/drawing/2014/main" id="{6C832C1B-2E78-E8DF-DC61-C8976EE4FD54}"/>
-                  </a:ext>
-                </a:extLst>
-              </p:cNvPr>
-              <p:cNvCxnSpPr>
-                <a:cxnSpLocks/>
-              </p:cNvCxnSpPr>
-              <p:nvPr/>
-            </p:nvCxnSpPr>
-            <p:spPr>
-              <a:xfrm flipV="1">
-                <a:off x="4171842" y="5501994"/>
-                <a:ext cx="326973" cy="220089"/>
-              </a:xfrm>
-              <a:prstGeom prst="line">
-                <a:avLst/>
-              </a:prstGeom>
-              <a:ln w="12700">
-                <a:solidFill>
-                  <a:schemeClr val="bg2">
-                    <a:lumMod val="10000"/>
-                  </a:schemeClr>
-                </a:solidFill>
-              </a:ln>
-            </p:spPr>
-            <p:style>
-              <a:lnRef idx="1">
-                <a:schemeClr val="accent1"/>
-              </a:lnRef>
-              <a:fillRef idx="0">
-                <a:schemeClr val="accent1"/>
-              </a:fillRef>
-              <a:effectRef idx="0">
-                <a:schemeClr val="accent1"/>
-              </a:effectRef>
-              <a:fontRef idx="minor">
-                <a:schemeClr val="tx1"/>
-              </a:fontRef>
-            </p:style>
-          </p:cxnSp>
-          <p:sp>
-            <p:nvSpPr>
-              <p:cNvPr id="118" name="テキスト ボックス 117">
-                <a:extLst>
-                  <a:ext uri="{FF2B5EF4-FFF2-40B4-BE49-F238E27FC236}">
-                    <a16:creationId xmlns:a16="http://schemas.microsoft.com/office/drawing/2014/main" id="{A27AF81A-AE51-31FB-AFA9-FE813B507371}"/>
-                  </a:ext>
-                </a:extLst>
-              </p:cNvPr>
-              <p:cNvSpPr txBox="1"/>
-              <p:nvPr/>
-            </p:nvSpPr>
-            <p:spPr>
-              <a:xfrm>
-                <a:off x="4329806" y="5341106"/>
-                <a:ext cx="351378" cy="292388"/>
-              </a:xfrm>
-              <a:prstGeom prst="rect">
-                <a:avLst/>
-              </a:prstGeom>
-              <a:noFill/>
-              <a:effectLst>
-                <a:outerShdw blurRad="50800" dist="38100" dir="2700000" algn="tl" rotWithShape="0">
-                  <a:prstClr val="black">
-                    <a:alpha val="40000"/>
-                  </a:prstClr>
-                </a:outerShdw>
-              </a:effectLst>
-            </p:spPr>
-            <p:txBody>
-              <a:bodyPr wrap="none" rtlCol="0">
-                <a:spAutoFit/>
-              </a:bodyPr>
-              <a:lstStyle/>
-              <a:p>
-                <a:r>
-                  <a:rPr lang="en" altLang="ja-JP" sz="1300" dirty="0">
-                    <a:solidFill>
-                      <a:srgbClr val="F8B62B"/>
-                    </a:solidFill>
-                    <a:latin typeface="Arial" panose="020B0604020202020204" pitchFamily="34" charset="0"/>
-                    <a:cs typeface="Arial" panose="020B0604020202020204" pitchFamily="34" charset="0"/>
-                  </a:rPr>
-                  <a:t>★</a:t>
-                </a:r>
-                <a:endParaRPr kumimoji="1" lang="ja-JP" altLang="en-US" sz="1300">
-                  <a:solidFill>
-                    <a:srgbClr val="F8B62B"/>
-                  </a:solidFill>
-                  <a:latin typeface="Arial" panose="020B0604020202020204" pitchFamily="34" charset="0"/>
-                  <a:cs typeface="Arial" panose="020B0604020202020204" pitchFamily="34" charset="0"/>
-                </a:endParaRPr>
-              </a:p>
-            </p:txBody>
-          </p:sp>
-          <p:cxnSp>
-            <p:nvCxnSpPr>
               <p:cNvPr id="139" name="直線コネクタ 138">
                 <a:extLst>
                   <a:ext uri="{FF2B5EF4-FFF2-40B4-BE49-F238E27FC236}">
@@ -13356,7 +13202,7 @@
                 <a:latin typeface="Arial" panose="020B0604020202020204" pitchFamily="34" charset="0"/>
                 <a:cs typeface="Arial" panose="020B0604020202020204" pitchFamily="34" charset="0"/>
               </a:rPr>
-              <a:t>Aug 2022</a:t>
+              <a:t>Jul 2023</a:t>
             </a:r>
             <a:endParaRPr lang="ja-JP" altLang="en-US" sz="2400" b="1">
               <a:solidFill>
@@ -13385,7 +13231,7 @@
         <p:spPr>
           <a:xfrm>
             <a:off x="8896237" y="1586753"/>
-            <a:ext cx="2802306" cy="5093702"/>
+            <a:ext cx="2802306" cy="5293757"/>
           </a:xfrm>
           <a:prstGeom prst="rect">
             <a:avLst/>
@@ -13502,7 +13348,7 @@
               <a:buChar char="★"/>
             </a:pPr>
             <a:r>
-              <a:rPr lang="ja-JP" altLang="en-US" sz="1300">
+              <a:rPr lang="en" altLang="ja-JP" sz="1300">
                 <a:solidFill>
                   <a:schemeClr val="bg2">
                     <a:lumMod val="10000"/>
@@ -13512,8 +13358,18 @@
                 <a:ea typeface="Meiryo UI" panose="020B0604030504040204" pitchFamily="34" charset="-128"/>
                 <a:cs typeface="Arial" panose="020B0604020202020204" pitchFamily="34" charset="0"/>
               </a:rPr>
-              <a:t>関西女子会</a:t>
-            </a:r>
+              <a:t>JAWS-UG DE&amp;I</a:t>
+            </a:r>
+            <a:endParaRPr lang="ja-JP" altLang="en-US" sz="1300">
+              <a:solidFill>
+                <a:schemeClr val="bg2">
+                  <a:lumMod val="10000"/>
+                </a:schemeClr>
+              </a:solidFill>
+              <a:latin typeface="Meiryo UI" panose="020B0604030504040204" pitchFamily="34" charset="-128"/>
+              <a:ea typeface="Meiryo UI" panose="020B0604030504040204" pitchFamily="34" charset="-128"/>
+              <a:cs typeface="Arial" panose="020B0604020202020204" pitchFamily="34" charset="0"/>
+            </a:endParaRPr>
           </a:p>
           <a:p>
             <a:pPr marL="285750" indent="-285750">
@@ -14093,8 +13949,38 @@
               </a:rPr>
               <a:t>専門支部</a:t>
             </a:r>
+            <a:endParaRPr lang="en-US" altLang="ja-JP" sz="1300">
+              <a:solidFill>
+                <a:schemeClr val="bg2">
+                  <a:lumMod val="10000"/>
+                </a:schemeClr>
+              </a:solidFill>
+              <a:latin typeface="Meiryo UI" panose="020B0604030504040204" pitchFamily="34" charset="-128"/>
+              <a:ea typeface="Meiryo UI" panose="020B0604030504040204" pitchFamily="34" charset="-128"/>
+              <a:cs typeface="Arial" panose="020B0604020202020204" pitchFamily="34" charset="0"/>
+            </a:endParaRPr>
           </a:p>
           <a:p>
+            <a:pPr marL="285750" indent="-285750">
+              <a:buClr>
+                <a:srgbClr val="F8B62B"/>
+              </a:buClr>
+              <a:buFont typeface="ヒラギノ明朝 ProN W3" panose="02020300000000000000" pitchFamily="18" charset="-128"/>
+              <a:buChar char="★"/>
+            </a:pPr>
+            <a:r>
+              <a:rPr lang="en-US" altLang="ja-JP" sz="1300">
+                <a:solidFill>
+                  <a:schemeClr val="bg2">
+                    <a:lumMod val="10000"/>
+                  </a:schemeClr>
+                </a:solidFill>
+                <a:latin typeface="Meiryo UI" panose="020B0604030504040204" pitchFamily="34" charset="-128"/>
+                <a:ea typeface="Meiryo UI" panose="020B0604030504040204" pitchFamily="34" charset="-128"/>
+                <a:cs typeface="Arial" panose="020B0604020202020204" pitchFamily="34" charset="0"/>
+              </a:rPr>
+              <a:t>Storage</a:t>
+            </a:r>
             <a:endParaRPr kumimoji="1" lang="ja-JP" altLang="en-US" sz="1300">
               <a:solidFill>
                 <a:schemeClr val="bg2">
@@ -14147,7 +14033,7 @@
                 <a:ea typeface="Meiryo UI" panose="020B0604030504040204" pitchFamily="34" charset="-128"/>
                 <a:cs typeface="Arial" panose="020B0604020202020204" pitchFamily="34" charset="0"/>
               </a:rPr>
-              <a:t>2022</a:t>
+              <a:t>2023</a:t>
             </a:r>
             <a:r>
               <a:rPr lang="ja-JP" altLang="en-US" sz="1400">
@@ -14173,7 +14059,7 @@
                 <a:ea typeface="Meiryo UI" panose="020B0604030504040204" pitchFamily="34" charset="-128"/>
                 <a:cs typeface="Arial" panose="020B0604020202020204" pitchFamily="34" charset="0"/>
               </a:rPr>
-              <a:t>8</a:t>
+              <a:t>7</a:t>
             </a:r>
             <a:r>
               <a:rPr lang="ja-JP" altLang="en-US" sz="1400">
@@ -15421,56 +15307,6 @@
           </p:sp>
           <p:sp>
             <p:nvSpPr>
-              <p:cNvPr id="135" name="テキスト ボックス 134">
-                <a:extLst>
-                  <a:ext uri="{FF2B5EF4-FFF2-40B4-BE49-F238E27FC236}">
-                    <a16:creationId xmlns:a16="http://schemas.microsoft.com/office/drawing/2014/main" id="{FA13D5EE-E1EF-4F34-F67B-BF591E264D9D}"/>
-                  </a:ext>
-                </a:extLst>
-              </p:cNvPr>
-              <p:cNvSpPr txBox="1"/>
-              <p:nvPr/>
-            </p:nvSpPr>
-            <p:spPr>
-              <a:xfrm>
-                <a:off x="3489674" y="5671372"/>
-                <a:ext cx="684803" cy="292388"/>
-              </a:xfrm>
-              <a:prstGeom prst="rect">
-                <a:avLst/>
-              </a:prstGeom>
-              <a:noFill/>
-            </p:spPr>
-            <p:txBody>
-              <a:bodyPr wrap="none" rtlCol="0">
-                <a:spAutoFit/>
-              </a:bodyPr>
-              <a:lstStyle/>
-              <a:p>
-                <a:r>
-                  <a:rPr lang="ja-JP" altLang="en-US" sz="1300">
-                    <a:solidFill>
-                      <a:schemeClr val="bg1"/>
-                    </a:solidFill>
-                    <a:latin typeface="Meiryo UI" panose="020B0604030504040204" pitchFamily="34" charset="-128"/>
-                    <a:ea typeface="Meiryo UI" panose="020B0604030504040204" pitchFamily="34" charset="-128"/>
-                    <a:cs typeface="Arial" panose="020B0604020202020204" pitchFamily="34" charset="0"/>
-                  </a:rPr>
-                  <a:t>鹿児島</a:t>
-                </a:r>
-                <a:endParaRPr kumimoji="1" lang="ja-JP" altLang="en-US" sz="1300">
-                  <a:solidFill>
-                    <a:schemeClr val="bg1"/>
-                  </a:solidFill>
-                  <a:latin typeface="Meiryo UI" panose="020B0604030504040204" pitchFamily="34" charset="-128"/>
-                  <a:ea typeface="Meiryo UI" panose="020B0604030504040204" pitchFamily="34" charset="-128"/>
-                  <a:cs typeface="Arial" panose="020B0604020202020204" pitchFamily="34" charset="0"/>
-                </a:endParaRPr>
-              </a:p>
-            </p:txBody>
-          </p:sp>
-          <p:sp>
-            <p:nvSpPr>
               <p:cNvPr id="136" name="テキスト ボックス 135">
                 <a:extLst>
                   <a:ext uri="{FF2B5EF4-FFF2-40B4-BE49-F238E27FC236}">
@@ -18638,106 +18474,6 @@
           </p:sp>
           <p:cxnSp>
             <p:nvCxnSpPr>
-              <p:cNvPr id="214" name="直線コネクタ 213">
-                <a:extLst>
-                  <a:ext uri="{FF2B5EF4-FFF2-40B4-BE49-F238E27FC236}">
-                    <a16:creationId xmlns:a16="http://schemas.microsoft.com/office/drawing/2014/main" id="{CBB55EED-FCA8-92E2-14F1-D1768039B33C}"/>
-                  </a:ext>
-                </a:extLst>
-              </p:cNvPr>
-              <p:cNvCxnSpPr>
-                <a:cxnSpLocks/>
-              </p:cNvCxnSpPr>
-              <p:nvPr/>
-            </p:nvCxnSpPr>
-            <p:spPr>
-              <a:xfrm flipV="1">
-                <a:off x="4171842" y="5501994"/>
-                <a:ext cx="326973" cy="220089"/>
-              </a:xfrm>
-              <a:prstGeom prst="line">
-                <a:avLst/>
-              </a:prstGeom>
-              <a:ln w="12700">
-                <a:solidFill>
-                  <a:schemeClr val="bg2">
-                    <a:lumMod val="10000"/>
-                  </a:schemeClr>
-                </a:solidFill>
-              </a:ln>
-            </p:spPr>
-            <p:style>
-              <a:lnRef idx="1">
-                <a:schemeClr val="accent1"/>
-              </a:lnRef>
-              <a:fillRef idx="0">
-                <a:schemeClr val="accent1"/>
-              </a:fillRef>
-              <a:effectRef idx="0">
-                <a:schemeClr val="accent1"/>
-              </a:effectRef>
-              <a:fontRef idx="minor">
-                <a:schemeClr val="tx1"/>
-              </a:fontRef>
-            </p:style>
-          </p:cxnSp>
-          <p:sp>
-            <p:nvSpPr>
-              <p:cNvPr id="215" name="テキスト ボックス 214">
-                <a:extLst>
-                  <a:ext uri="{FF2B5EF4-FFF2-40B4-BE49-F238E27FC236}">
-                    <a16:creationId xmlns:a16="http://schemas.microsoft.com/office/drawing/2014/main" id="{8B12DBC4-615D-7AB9-98B6-826BBFB05FAD}"/>
-                  </a:ext>
-                </a:extLst>
-              </p:cNvPr>
-              <p:cNvSpPr txBox="1"/>
-              <p:nvPr/>
-            </p:nvSpPr>
-            <p:spPr>
-              <a:xfrm>
-                <a:off x="4329806" y="5341106"/>
-                <a:ext cx="351378" cy="292388"/>
-              </a:xfrm>
-              <a:prstGeom prst="rect">
-                <a:avLst/>
-              </a:prstGeom>
-              <a:noFill/>
-              <a:effectLst>
-                <a:outerShdw blurRad="50800" dist="38100" dir="2700000" algn="tl" rotWithShape="0">
-                  <a:prstClr val="black">
-                    <a:alpha val="40000"/>
-                  </a:prstClr>
-                </a:outerShdw>
-              </a:effectLst>
-            </p:spPr>
-            <p:txBody>
-              <a:bodyPr wrap="none" rtlCol="0">
-                <a:spAutoFit/>
-              </a:bodyPr>
-              <a:lstStyle/>
-              <a:p>
-                <a:r>
-                  <a:rPr lang="en" altLang="ja-JP" sz="1300" dirty="0">
-                    <a:solidFill>
-                      <a:srgbClr val="F8B62B"/>
-                    </a:solidFill>
-                    <a:latin typeface="Arial" panose="020B0604020202020204" pitchFamily="34" charset="0"/>
-                    <a:cs typeface="Arial" panose="020B0604020202020204" pitchFamily="34" charset="0"/>
-                  </a:rPr>
-                  <a:t>★</a:t>
-                </a:r>
-                <a:endParaRPr kumimoji="1" lang="ja-JP" altLang="en-US" sz="1300">
-                  <a:solidFill>
-                    <a:srgbClr val="F8B62B"/>
-                  </a:solidFill>
-                  <a:latin typeface="Arial" panose="020B0604020202020204" pitchFamily="34" charset="0"/>
-                  <a:cs typeface="Arial" panose="020B0604020202020204" pitchFamily="34" charset="0"/>
-                </a:endParaRPr>
-              </a:p>
-            </p:txBody>
-          </p:sp>
-          <p:cxnSp>
-            <p:nvCxnSpPr>
               <p:cNvPr id="216" name="直線コネクタ 215">
                 <a:extLst>
                   <a:ext uri="{FF2B5EF4-FFF2-40B4-BE49-F238E27FC236}">
@@ -19918,7 +19654,7 @@
         <p:spPr>
           <a:xfrm>
             <a:off x="8896237" y="1586753"/>
-            <a:ext cx="2802306" cy="5093702"/>
+            <a:ext cx="2802306" cy="5293757"/>
           </a:xfrm>
           <a:prstGeom prst="rect">
             <a:avLst/>
@@ -20023,7 +19759,7 @@
               <a:buChar char="★"/>
             </a:pPr>
             <a:r>
-              <a:rPr lang="ja-JP" altLang="en-US" sz="1300">
+              <a:rPr lang="en" altLang="ja-JP" sz="1300">
                 <a:solidFill>
                   <a:schemeClr val="bg1"/>
                 </a:solidFill>
@@ -20031,7 +19767,7 @@
                 <a:ea typeface="Meiryo UI" panose="020B0604030504040204" pitchFamily="34" charset="-128"/>
                 <a:cs typeface="Arial" panose="020B0604020202020204" pitchFamily="34" charset="0"/>
               </a:rPr>
-              <a:t>関西女子会</a:t>
+              <a:t>JAWS-UG DE&amp;I</a:t>
             </a:r>
           </a:p>
           <a:p>
@@ -20552,6 +20288,42 @@
               </a:rPr>
               <a:t>専門支部</a:t>
             </a:r>
+            <a:endParaRPr lang="en-US" altLang="ja-JP" sz="1300">
+              <a:solidFill>
+                <a:schemeClr val="bg1"/>
+              </a:solidFill>
+              <a:latin typeface="Meiryo UI" panose="020B0604030504040204" pitchFamily="34" charset="-128"/>
+              <a:ea typeface="Meiryo UI" panose="020B0604030504040204" pitchFamily="34" charset="-128"/>
+              <a:cs typeface="Arial" panose="020B0604020202020204" pitchFamily="34" charset="0"/>
+            </a:endParaRPr>
+          </a:p>
+          <a:p>
+            <a:pPr marL="285750" indent="-285750">
+              <a:buClr>
+                <a:srgbClr val="F8B62B"/>
+              </a:buClr>
+              <a:buFont typeface="ヒラギノ明朝 ProN W3" panose="02020300000000000000" pitchFamily="18" charset="-128"/>
+              <a:buChar char="★"/>
+            </a:pPr>
+            <a:r>
+              <a:rPr lang="en" altLang="ja-JP" sz="1300">
+                <a:solidFill>
+                  <a:schemeClr val="bg1"/>
+                </a:solidFill>
+                <a:latin typeface="Meiryo UI" panose="020B0604030504040204" pitchFamily="34" charset="-128"/>
+                <a:ea typeface="Meiryo UI" panose="020B0604030504040204" pitchFamily="34" charset="-128"/>
+                <a:cs typeface="Arial" panose="020B0604020202020204" pitchFamily="34" charset="0"/>
+              </a:rPr>
+              <a:t>Storage</a:t>
+            </a:r>
+            <a:endParaRPr lang="ja-JP" altLang="en-US" sz="1300">
+              <a:solidFill>
+                <a:schemeClr val="bg1"/>
+              </a:solidFill>
+              <a:latin typeface="Meiryo UI" panose="020B0604030504040204" pitchFamily="34" charset="-128"/>
+              <a:ea typeface="Meiryo UI" panose="020B0604030504040204" pitchFamily="34" charset="-128"/>
+              <a:cs typeface="Arial" panose="020B0604020202020204" pitchFamily="34" charset="0"/>
+            </a:endParaRPr>
           </a:p>
           <a:p>
             <a:endParaRPr kumimoji="1" lang="ja-JP" altLang="en-US" sz="1300">
@@ -20899,7 +20671,7 @@
                 <a:ea typeface="Meiryo UI" panose="020B0604030504040204" pitchFamily="34" charset="-128"/>
                 <a:cs typeface="Arial" panose="020B0604020202020204" pitchFamily="34" charset="0"/>
               </a:rPr>
-              <a:t>2022</a:t>
+              <a:t>2023</a:t>
             </a:r>
             <a:r>
               <a:rPr lang="ja-JP" altLang="en-US" sz="1400">
@@ -20921,7 +20693,7 @@
                 <a:ea typeface="Meiryo UI" panose="020B0604030504040204" pitchFamily="34" charset="-128"/>
                 <a:cs typeface="Arial" panose="020B0604020202020204" pitchFamily="34" charset="0"/>
               </a:rPr>
-              <a:t>8</a:t>
+              <a:t>7</a:t>
             </a:r>
             <a:r>
               <a:rPr lang="ja-JP" altLang="en-US" sz="1400">
@@ -20934,6 +20706,54 @@
               </a:rPr>
               <a:t>月現在</a:t>
             </a:r>
+          </a:p>
+        </p:txBody>
+      </p:sp>
+      <p:sp>
+        <p:nvSpPr>
+          <p:cNvPr id="5" name="テキスト ボックス 4">
+            <a:extLst>
+              <a:ext uri="{FF2B5EF4-FFF2-40B4-BE49-F238E27FC236}">
+                <a16:creationId xmlns:a16="http://schemas.microsoft.com/office/drawing/2014/main" id="{C3E484AC-E5FD-826C-C4CC-412401479159}"/>
+              </a:ext>
+            </a:extLst>
+          </p:cNvPr>
+          <p:cNvSpPr txBox="1"/>
+          <p:nvPr/>
+        </p:nvSpPr>
+        <p:spPr>
+          <a:xfrm>
+            <a:off x="864584" y="6182265"/>
+            <a:ext cx="4125196" cy="461665"/>
+          </a:xfrm>
+          <a:prstGeom prst="rect">
+            <a:avLst/>
+          </a:prstGeom>
+          <a:noFill/>
+        </p:spPr>
+        <p:txBody>
+          <a:bodyPr wrap="square">
+            <a:spAutoFit/>
+          </a:bodyPr>
+          <a:lstStyle/>
+          <a:p>
+            <a:r>
+              <a:rPr lang="en-US" altLang="ja-JP" sz="2400" b="1" dirty="0">
+                <a:solidFill>
+                  <a:schemeClr val="bg1"/>
+                </a:solidFill>
+                <a:latin typeface="Arial" panose="020B0604020202020204" pitchFamily="34" charset="0"/>
+                <a:cs typeface="Arial" panose="020B0604020202020204" pitchFamily="34" charset="0"/>
+              </a:rPr>
+              <a:t>Jul 2023</a:t>
+            </a:r>
+            <a:endParaRPr lang="ja-JP" altLang="en-US" sz="2400" b="1">
+              <a:solidFill>
+                <a:schemeClr val="bg1"/>
+              </a:solidFill>
+              <a:latin typeface="Arial" panose="020B0604020202020204" pitchFamily="34" charset="0"/>
+              <a:cs typeface="Arial" panose="020B0604020202020204" pitchFamily="34" charset="0"/>
+            </a:endParaRPr>
           </a:p>
         </p:txBody>
       </p:sp>
@@ -22171,58 +21991,6 @@
                   <a:cs typeface="Arial" panose="020B0604020202020204" pitchFamily="34" charset="0"/>
                 </a:rPr>
                 <a:t>Kumamoto</a:t>
-              </a:r>
-              <a:endParaRPr kumimoji="1" lang="ja-JP" altLang="en-US" sz="1300">
-                <a:solidFill>
-                  <a:schemeClr val="bg2">
-                    <a:lumMod val="10000"/>
-                  </a:schemeClr>
-                </a:solidFill>
-                <a:latin typeface="Arial" panose="020B0604020202020204" pitchFamily="34" charset="0"/>
-                <a:cs typeface="Arial" panose="020B0604020202020204" pitchFamily="34" charset="0"/>
-              </a:endParaRPr>
-            </a:p>
-          </p:txBody>
-        </p:sp>
-        <p:sp>
-          <p:nvSpPr>
-            <p:cNvPr id="35" name="テキスト ボックス 34">
-              <a:extLst>
-                <a:ext uri="{FF2B5EF4-FFF2-40B4-BE49-F238E27FC236}">
-                  <a16:creationId xmlns:a16="http://schemas.microsoft.com/office/drawing/2014/main" id="{F7DBD9A4-386D-405B-6EBE-D7329DF05B5D}"/>
-                </a:ext>
-              </a:extLst>
-            </p:cNvPr>
-            <p:cNvSpPr txBox="1"/>
-            <p:nvPr/>
-          </p:nvSpPr>
-          <p:spPr>
-            <a:xfrm>
-              <a:off x="3489674" y="5671372"/>
-              <a:ext cx="1019831" cy="292388"/>
-            </a:xfrm>
-            <a:prstGeom prst="rect">
-              <a:avLst/>
-            </a:prstGeom>
-            <a:noFill/>
-          </p:spPr>
-          <p:txBody>
-            <a:bodyPr wrap="none" rtlCol="0">
-              <a:spAutoFit/>
-            </a:bodyPr>
-            <a:lstStyle/>
-            <a:p>
-              <a:r>
-                <a:rPr lang="en" altLang="ja-JP" sz="1300" dirty="0">
-                  <a:solidFill>
-                    <a:schemeClr val="bg2">
-                      <a:lumMod val="10000"/>
-                    </a:schemeClr>
-                  </a:solidFill>
-                  <a:latin typeface="Arial" panose="020B0604020202020204" pitchFamily="34" charset="0"/>
-                  <a:cs typeface="Arial" panose="020B0604020202020204" pitchFamily="34" charset="0"/>
-                </a:rPr>
-                <a:t>Kagoshima</a:t>
               </a:r>
               <a:endParaRPr kumimoji="1" lang="ja-JP" altLang="en-US" sz="1300">
                 <a:solidFill>
@@ -25461,106 +25229,6 @@
         </p:sp>
         <p:cxnSp>
           <p:nvCxnSpPr>
-            <p:cNvPr id="137" name="直線コネクタ 136">
-              <a:extLst>
-                <a:ext uri="{FF2B5EF4-FFF2-40B4-BE49-F238E27FC236}">
-                  <a16:creationId xmlns:a16="http://schemas.microsoft.com/office/drawing/2014/main" id="{6C832C1B-2E78-E8DF-DC61-C8976EE4FD54}"/>
-                </a:ext>
-              </a:extLst>
-            </p:cNvPr>
-            <p:cNvCxnSpPr>
-              <a:cxnSpLocks/>
-            </p:cNvCxnSpPr>
-            <p:nvPr/>
-          </p:nvCxnSpPr>
-          <p:spPr>
-            <a:xfrm flipV="1">
-              <a:off x="4171842" y="5501994"/>
-              <a:ext cx="326973" cy="220089"/>
-            </a:xfrm>
-            <a:prstGeom prst="line">
-              <a:avLst/>
-            </a:prstGeom>
-            <a:ln w="12700">
-              <a:solidFill>
-                <a:schemeClr val="bg2">
-                  <a:lumMod val="10000"/>
-                </a:schemeClr>
-              </a:solidFill>
-            </a:ln>
-          </p:spPr>
-          <p:style>
-            <a:lnRef idx="1">
-              <a:schemeClr val="accent1"/>
-            </a:lnRef>
-            <a:fillRef idx="0">
-              <a:schemeClr val="accent1"/>
-            </a:fillRef>
-            <a:effectRef idx="0">
-              <a:schemeClr val="accent1"/>
-            </a:effectRef>
-            <a:fontRef idx="minor">
-              <a:schemeClr val="tx1"/>
-            </a:fontRef>
-          </p:style>
-        </p:cxnSp>
-        <p:sp>
-          <p:nvSpPr>
-            <p:cNvPr id="118" name="テキスト ボックス 117">
-              <a:extLst>
-                <a:ext uri="{FF2B5EF4-FFF2-40B4-BE49-F238E27FC236}">
-                  <a16:creationId xmlns:a16="http://schemas.microsoft.com/office/drawing/2014/main" id="{A27AF81A-AE51-31FB-AFA9-FE813B507371}"/>
-                </a:ext>
-              </a:extLst>
-            </p:cNvPr>
-            <p:cNvSpPr txBox="1"/>
-            <p:nvPr/>
-          </p:nvSpPr>
-          <p:spPr>
-            <a:xfrm>
-              <a:off x="4329806" y="5341106"/>
-              <a:ext cx="351378" cy="292388"/>
-            </a:xfrm>
-            <a:prstGeom prst="rect">
-              <a:avLst/>
-            </a:prstGeom>
-            <a:noFill/>
-            <a:effectLst>
-              <a:outerShdw blurRad="50800" dist="38100" dir="2700000" algn="tl" rotWithShape="0">
-                <a:prstClr val="black">
-                  <a:alpha val="40000"/>
-                </a:prstClr>
-              </a:outerShdw>
-            </a:effectLst>
-          </p:spPr>
-          <p:txBody>
-            <a:bodyPr wrap="none" rtlCol="0">
-              <a:spAutoFit/>
-            </a:bodyPr>
-            <a:lstStyle/>
-            <a:p>
-              <a:r>
-                <a:rPr lang="en" altLang="ja-JP" sz="1300" dirty="0">
-                  <a:solidFill>
-                    <a:srgbClr val="F8B62B"/>
-                  </a:solidFill>
-                  <a:latin typeface="Arial" panose="020B0604020202020204" pitchFamily="34" charset="0"/>
-                  <a:cs typeface="Arial" panose="020B0604020202020204" pitchFamily="34" charset="0"/>
-                </a:rPr>
-                <a:t>★</a:t>
-              </a:r>
-              <a:endParaRPr kumimoji="1" lang="ja-JP" altLang="en-US" sz="1300">
-                <a:solidFill>
-                  <a:srgbClr val="F8B62B"/>
-                </a:solidFill>
-                <a:latin typeface="Arial" panose="020B0604020202020204" pitchFamily="34" charset="0"/>
-                <a:cs typeface="Arial" panose="020B0604020202020204" pitchFamily="34" charset="0"/>
-              </a:endParaRPr>
-            </a:p>
-          </p:txBody>
-        </p:sp>
-        <p:cxnSp>
-          <p:nvCxnSpPr>
             <p:cNvPr id="139" name="直線コネクタ 138">
               <a:extLst>
                 <a:ext uri="{FF2B5EF4-FFF2-40B4-BE49-F238E27FC236}">
@@ -27051,7 +26719,7 @@
                 <a:latin typeface="Arial" panose="020B0604020202020204" pitchFamily="34" charset="0"/>
                 <a:cs typeface="Arial" panose="020B0604020202020204" pitchFamily="34" charset="0"/>
               </a:rPr>
-              <a:t>Aug 2022</a:t>
+              <a:t>Jul 2023</a:t>
             </a:r>
             <a:endParaRPr lang="ja-JP" altLang="en-US" sz="2400" b="1">
               <a:solidFill>
@@ -27080,7 +26748,7 @@
         <p:spPr>
           <a:xfrm>
             <a:off x="8896237" y="1586753"/>
-            <a:ext cx="2431178" cy="5093702"/>
+            <a:ext cx="2431178" cy="5293757"/>
           </a:xfrm>
           <a:prstGeom prst="rect">
             <a:avLst/>
@@ -27152,7 +26820,7 @@
                 <a:latin typeface="Arial" panose="020B0604020202020204" pitchFamily="34" charset="0"/>
                 <a:cs typeface="Arial" panose="020B0604020202020204" pitchFamily="34" charset="0"/>
               </a:rPr>
-              <a:t>Kansai Girls</a:t>
+              <a:t>DE&amp;I</a:t>
             </a:r>
           </a:p>
           <a:p>
@@ -27604,15 +27272,27 @@
               </a:rPr>
               <a:t>GameTech</a:t>
             </a:r>
-            <a:endParaRPr lang="en" altLang="ja-JP" sz="1300" dirty="0">
-              <a:solidFill>
-                <a:schemeClr val="bg2">
-                  <a:lumMod val="10000"/>
-                </a:schemeClr>
-              </a:solidFill>
-              <a:latin typeface="Arial" panose="020B0604020202020204" pitchFamily="34" charset="0"/>
-              <a:cs typeface="Arial" panose="020B0604020202020204" pitchFamily="34" charset="0"/>
-            </a:endParaRPr>
+          </a:p>
+          <a:p>
+            <a:pPr marL="285750" indent="-285750">
+              <a:buClr>
+                <a:srgbClr val="F8B62B"/>
+              </a:buClr>
+              <a:buFont typeface="ヒラギノ明朝 ProN W3" panose="02020300000000000000" pitchFamily="18" charset="-128"/>
+              <a:buChar char="★"/>
+            </a:pPr>
+            <a:r>
+              <a:rPr lang="en" altLang="ja-JP" sz="1300" dirty="0">
+                <a:solidFill>
+                  <a:schemeClr val="bg2">
+                    <a:lumMod val="10000"/>
+                  </a:schemeClr>
+                </a:solidFill>
+                <a:latin typeface="Arial" panose="020B0604020202020204" pitchFamily="34" charset="0"/>
+                <a:cs typeface="Arial" panose="020B0604020202020204" pitchFamily="34" charset="0"/>
+              </a:rPr>
+              <a:t>Storage</a:t>
+            </a:r>
           </a:p>
           <a:p>
             <a:endParaRPr kumimoji="1" lang="ja-JP" altLang="en-US" sz="1300">
@@ -28912,54 +28592,6 @@
                   <a:cs typeface="Arial" panose="020B0604020202020204" pitchFamily="34" charset="0"/>
                 </a:rPr>
                 <a:t>Kumamoto</a:t>
-              </a:r>
-              <a:endParaRPr kumimoji="1" lang="ja-JP" altLang="en-US" sz="1300">
-                <a:solidFill>
-                  <a:schemeClr val="bg1"/>
-                </a:solidFill>
-                <a:latin typeface="Arial" panose="020B0604020202020204" pitchFamily="34" charset="0"/>
-                <a:cs typeface="Arial" panose="020B0604020202020204" pitchFamily="34" charset="0"/>
-              </a:endParaRPr>
-            </a:p>
-          </p:txBody>
-        </p:sp>
-        <p:sp>
-          <p:nvSpPr>
-            <p:cNvPr id="35" name="テキスト ボックス 34">
-              <a:extLst>
-                <a:ext uri="{FF2B5EF4-FFF2-40B4-BE49-F238E27FC236}">
-                  <a16:creationId xmlns:a16="http://schemas.microsoft.com/office/drawing/2014/main" id="{F7DBD9A4-386D-405B-6EBE-D7329DF05B5D}"/>
-                </a:ext>
-              </a:extLst>
-            </p:cNvPr>
-            <p:cNvSpPr txBox="1"/>
-            <p:nvPr/>
-          </p:nvSpPr>
-          <p:spPr>
-            <a:xfrm>
-              <a:off x="3489674" y="5671372"/>
-              <a:ext cx="1019831" cy="292388"/>
-            </a:xfrm>
-            <a:prstGeom prst="rect">
-              <a:avLst/>
-            </a:prstGeom>
-            <a:noFill/>
-          </p:spPr>
-          <p:txBody>
-            <a:bodyPr wrap="none" rtlCol="0">
-              <a:spAutoFit/>
-            </a:bodyPr>
-            <a:lstStyle/>
-            <a:p>
-              <a:r>
-                <a:rPr lang="en" altLang="ja-JP" sz="1300" dirty="0">
-                  <a:solidFill>
-                    <a:schemeClr val="bg1"/>
-                  </a:solidFill>
-                  <a:latin typeface="Arial" panose="020B0604020202020204" pitchFamily="34" charset="0"/>
-                  <a:cs typeface="Arial" panose="020B0604020202020204" pitchFamily="34" charset="0"/>
-                </a:rPr>
-                <a:t>Kagoshima</a:t>
               </a:r>
               <a:endParaRPr kumimoji="1" lang="ja-JP" altLang="en-US" sz="1300">
                 <a:solidFill>
@@ -32084,104 +31716,6 @@
         </p:sp>
         <p:cxnSp>
           <p:nvCxnSpPr>
-            <p:cNvPr id="137" name="直線コネクタ 136">
-              <a:extLst>
-                <a:ext uri="{FF2B5EF4-FFF2-40B4-BE49-F238E27FC236}">
-                  <a16:creationId xmlns:a16="http://schemas.microsoft.com/office/drawing/2014/main" id="{6C832C1B-2E78-E8DF-DC61-C8976EE4FD54}"/>
-                </a:ext>
-              </a:extLst>
-            </p:cNvPr>
-            <p:cNvCxnSpPr>
-              <a:cxnSpLocks/>
-            </p:cNvCxnSpPr>
-            <p:nvPr/>
-          </p:nvCxnSpPr>
-          <p:spPr>
-            <a:xfrm flipV="1">
-              <a:off x="4171842" y="5501994"/>
-              <a:ext cx="326973" cy="220089"/>
-            </a:xfrm>
-            <a:prstGeom prst="line">
-              <a:avLst/>
-            </a:prstGeom>
-            <a:ln w="12700">
-              <a:solidFill>
-                <a:schemeClr val="bg1"/>
-              </a:solidFill>
-            </a:ln>
-          </p:spPr>
-          <p:style>
-            <a:lnRef idx="1">
-              <a:schemeClr val="accent1"/>
-            </a:lnRef>
-            <a:fillRef idx="0">
-              <a:schemeClr val="accent1"/>
-            </a:fillRef>
-            <a:effectRef idx="0">
-              <a:schemeClr val="accent1"/>
-            </a:effectRef>
-            <a:fontRef idx="minor">
-              <a:schemeClr val="tx1"/>
-            </a:fontRef>
-          </p:style>
-        </p:cxnSp>
-        <p:sp>
-          <p:nvSpPr>
-            <p:cNvPr id="118" name="テキスト ボックス 117">
-              <a:extLst>
-                <a:ext uri="{FF2B5EF4-FFF2-40B4-BE49-F238E27FC236}">
-                  <a16:creationId xmlns:a16="http://schemas.microsoft.com/office/drawing/2014/main" id="{A27AF81A-AE51-31FB-AFA9-FE813B507371}"/>
-                </a:ext>
-              </a:extLst>
-            </p:cNvPr>
-            <p:cNvSpPr txBox="1"/>
-            <p:nvPr/>
-          </p:nvSpPr>
-          <p:spPr>
-            <a:xfrm>
-              <a:off x="4329806" y="5341106"/>
-              <a:ext cx="351378" cy="292388"/>
-            </a:xfrm>
-            <a:prstGeom prst="rect">
-              <a:avLst/>
-            </a:prstGeom>
-            <a:noFill/>
-            <a:effectLst>
-              <a:outerShdw blurRad="50800" dist="38100" dir="2700000" algn="tl" rotWithShape="0">
-                <a:prstClr val="black">
-                  <a:alpha val="40000"/>
-                </a:prstClr>
-              </a:outerShdw>
-            </a:effectLst>
-          </p:spPr>
-          <p:txBody>
-            <a:bodyPr wrap="none" rtlCol="0">
-              <a:spAutoFit/>
-            </a:bodyPr>
-            <a:lstStyle/>
-            <a:p>
-              <a:r>
-                <a:rPr lang="en" altLang="ja-JP" sz="1300" dirty="0">
-                  <a:solidFill>
-                    <a:srgbClr val="F8B62B"/>
-                  </a:solidFill>
-                  <a:latin typeface="Arial" panose="020B0604020202020204" pitchFamily="34" charset="0"/>
-                  <a:cs typeface="Arial" panose="020B0604020202020204" pitchFamily="34" charset="0"/>
-                </a:rPr>
-                <a:t>★</a:t>
-              </a:r>
-              <a:endParaRPr kumimoji="1" lang="ja-JP" altLang="en-US" sz="1300">
-                <a:solidFill>
-                  <a:srgbClr val="F8B62B"/>
-                </a:solidFill>
-                <a:latin typeface="Arial" panose="020B0604020202020204" pitchFamily="34" charset="0"/>
-                <a:cs typeface="Arial" panose="020B0604020202020204" pitchFamily="34" charset="0"/>
-              </a:endParaRPr>
-            </a:p>
-          </p:txBody>
-        </p:sp>
-        <p:cxnSp>
-          <p:nvCxnSpPr>
             <p:cNvPr id="139" name="直線コネクタ 138">
               <a:extLst>
                 <a:ext uri="{FF2B5EF4-FFF2-40B4-BE49-F238E27FC236}">
@@ -33486,7 +33020,7 @@
                 <a:latin typeface="Arial" panose="020B0604020202020204" pitchFamily="34" charset="0"/>
                 <a:cs typeface="Arial" panose="020B0604020202020204" pitchFamily="34" charset="0"/>
               </a:rPr>
-              <a:t>Aug 2022</a:t>
+              <a:t>Jul 2023</a:t>
             </a:r>
             <a:endParaRPr lang="ja-JP" altLang="en-US" sz="2400" b="1">
               <a:solidFill>
@@ -33513,7 +33047,7 @@
         <p:spPr>
           <a:xfrm>
             <a:off x="8896237" y="1586753"/>
-            <a:ext cx="2431178" cy="5093702"/>
+            <a:ext cx="2431178" cy="5293757"/>
           </a:xfrm>
           <a:prstGeom prst="rect">
             <a:avLst/>
@@ -33579,7 +33113,7 @@
                 <a:latin typeface="Arial" panose="020B0604020202020204" pitchFamily="34" charset="0"/>
                 <a:cs typeface="Arial" panose="020B0604020202020204" pitchFamily="34" charset="0"/>
               </a:rPr>
-              <a:t>Kansai Girls</a:t>
+              <a:t>DE&amp;I</a:t>
             </a:r>
           </a:p>
           <a:p>
@@ -33987,15 +33521,25 @@
               </a:rPr>
               <a:t>GameTech</a:t>
             </a:r>
-            <a:endParaRPr lang="en" altLang="ja-JP" sz="1300" dirty="0">
-              <a:solidFill>
-                <a:schemeClr val="bg1"/>
-              </a:solidFill>
-              <a:latin typeface="Arial" panose="020B0604020202020204" pitchFamily="34" charset="0"/>
-              <a:cs typeface="Arial" panose="020B0604020202020204" pitchFamily="34" charset="0"/>
-            </a:endParaRPr>
           </a:p>
           <a:p>
+            <a:pPr marL="285750" indent="-285750">
+              <a:buClr>
+                <a:srgbClr val="F8B62B"/>
+              </a:buClr>
+              <a:buFont typeface="ヒラギノ明朝 ProN W3" panose="02020300000000000000" pitchFamily="18" charset="-128"/>
+              <a:buChar char="★"/>
+            </a:pPr>
+            <a:r>
+              <a:rPr lang="en" altLang="ja-JP" sz="1300" dirty="0">
+                <a:solidFill>
+                  <a:schemeClr val="bg1"/>
+                </a:solidFill>
+                <a:latin typeface="Arial" panose="020B0604020202020204" pitchFamily="34" charset="0"/>
+                <a:cs typeface="Arial" panose="020B0604020202020204" pitchFamily="34" charset="0"/>
+              </a:rPr>
+              <a:t>Storage</a:t>
+            </a:r>
             <a:endParaRPr kumimoji="1" lang="ja-JP" altLang="en-US" sz="1300">
               <a:solidFill>
                 <a:schemeClr val="bg1"/>

</xml_diff>

<commit_message>
Correct Iwate to Hiragana
</commit_message>
<xml_diff>
--- a/jaws-ug-map.pptx
+++ b/jaws-ug-map.pptx
@@ -12778,7 +12778,7 @@
             <p:spPr>
               <a:xfrm>
                 <a:off x="8006256" y="2434365"/>
-                <a:ext cx="524503" cy="292388"/>
+                <a:ext cx="593432" cy="292388"/>
               </a:xfrm>
               <a:prstGeom prst="rect">
                 <a:avLst/>
@@ -12802,7 +12802,7 @@
                     <a:ea typeface="Meiryo UI" panose="020B0604030504040204" pitchFamily="34" charset="-128"/>
                     <a:cs typeface="Arial" panose="020B0604020202020204" pitchFamily="34" charset="0"/>
                   </a:rPr>
-                  <a:t>岩手</a:t>
+                  <a:t>いわて</a:t>
                 </a:r>
               </a:p>
             </p:txBody>
@@ -21176,7 +21176,7 @@
         <p:spPr>
           <a:xfrm>
             <a:off x="8006256" y="2434365"/>
-            <a:ext cx="524503" cy="292388"/>
+            <a:ext cx="593432" cy="292388"/>
           </a:xfrm>
           <a:prstGeom prst="rect">
             <a:avLst/>
@@ -21198,7 +21198,7 @@
                 <a:ea typeface="Meiryo UI" panose="020B0604030504040204" pitchFamily="34" charset="-128"/>
                 <a:cs typeface="Arial" panose="020B0604020202020204" pitchFamily="34" charset="0"/>
               </a:rPr>
-              <a:t>岩手</a:t>
+              <a:t>いわて</a:t>
             </a:r>
           </a:p>
         </p:txBody>

</xml_diff>